<commit_message>
updated ppt & script V1
</commit_message>
<xml_diff>
--- a/IHRM ppt.pptx
+++ b/IHRM ppt.pptx
@@ -229,7 +229,7 @@
           <a:p>
             <a:fld id="{BBF2A33D-49AB-44EE-8BF3-76D9284DA1F5}" type="datetimeFigureOut">
               <a:rPr lang="en-US" smtClean="0"/>
-              <a:t>5/14/2024</a:t>
+              <a:t>6/5/2024</a:t>
             </a:fld>
             <a:endParaRPr lang="en-US"/>
           </a:p>
@@ -672,7 +672,7 @@
           <a:p>
             <a:fld id="{676D6C8F-539E-45F2-82EF-9DA4B21A660E}" type="datetime1">
               <a:rPr lang="en-US" smtClean="0"/>
-              <a:t>5/14/2024</a:t>
+              <a:t>6/5/2024</a:t>
             </a:fld>
             <a:endParaRPr lang="en-US"/>
           </a:p>
@@ -836,7 +836,7 @@
           <a:p>
             <a:fld id="{65CD9255-8072-435B-8841-D19F039C78D7}" type="datetime1">
               <a:rPr lang="en-US" smtClean="0"/>
-              <a:t>5/14/2024</a:t>
+              <a:t>6/5/2024</a:t>
             </a:fld>
             <a:endParaRPr lang="en-US"/>
           </a:p>
@@ -1010,7 +1010,7 @@
           <a:p>
             <a:fld id="{F52B6641-BF81-4C68-B324-2027E0A993B1}" type="datetime1">
               <a:rPr lang="en-US" smtClean="0"/>
-              <a:t>5/14/2024</a:t>
+              <a:t>6/5/2024</a:t>
             </a:fld>
             <a:endParaRPr lang="en-US"/>
           </a:p>
@@ -1174,7 +1174,7 @@
           <a:p>
             <a:fld id="{415DDA16-5648-43ED-8F33-68021E1E0DD4}" type="datetime1">
               <a:rPr lang="en-US" smtClean="0"/>
-              <a:t>5/14/2024</a:t>
+              <a:t>6/5/2024</a:t>
             </a:fld>
             <a:endParaRPr lang="en-US"/>
           </a:p>
@@ -1415,7 +1415,7 @@
           <a:p>
             <a:fld id="{0E5420FC-43FE-4C26-9126-20872F97BAFF}" type="datetime1">
               <a:rPr lang="en-US" smtClean="0"/>
-              <a:t>5/14/2024</a:t>
+              <a:t>6/5/2024</a:t>
             </a:fld>
             <a:endParaRPr lang="en-US"/>
           </a:p>
@@ -1696,7 +1696,7 @@
           <a:p>
             <a:fld id="{BC711861-911F-4087-AA0D-31F51408129C}" type="datetime1">
               <a:rPr lang="en-US" smtClean="0"/>
-              <a:t>5/14/2024</a:t>
+              <a:t>6/5/2024</a:t>
             </a:fld>
             <a:endParaRPr lang="en-US"/>
           </a:p>
@@ -2111,7 +2111,7 @@
           <a:p>
             <a:fld id="{053E25BA-EDB6-400C-9FDB-90958856A554}" type="datetime1">
               <a:rPr lang="en-US" smtClean="0"/>
-              <a:t>5/14/2024</a:t>
+              <a:t>6/5/2024</a:t>
             </a:fld>
             <a:endParaRPr lang="en-US"/>
           </a:p>
@@ -2224,7 +2224,7 @@
           <a:p>
             <a:fld id="{D8433F74-86A5-4FD8-B82E-5C3082684C0B}" type="datetime1">
               <a:rPr lang="en-US" smtClean="0"/>
-              <a:t>5/14/2024</a:t>
+              <a:t>6/5/2024</a:t>
             </a:fld>
             <a:endParaRPr lang="en-US"/>
           </a:p>
@@ -2315,7 +2315,7 @@
           <a:p>
             <a:fld id="{2E1F55D2-012E-4587-AB96-83C5FA911873}" type="datetime1">
               <a:rPr lang="en-US" smtClean="0"/>
-              <a:t>5/14/2024</a:t>
+              <a:t>6/5/2024</a:t>
             </a:fld>
             <a:endParaRPr lang="en-US"/>
           </a:p>
@@ -2586,7 +2586,7 @@
           <a:p>
             <a:fld id="{90886C48-01DE-4593-AA2F-ED6C66969C94}" type="datetime1">
               <a:rPr lang="en-US" smtClean="0"/>
-              <a:t>5/14/2024</a:t>
+              <a:t>6/5/2024</a:t>
             </a:fld>
             <a:endParaRPr lang="en-US"/>
           </a:p>
@@ -2834,7 +2834,7 @@
           <a:p>
             <a:fld id="{DA5C5A30-4703-4CE9-8DBA-B93F35E541CD}" type="datetime1">
               <a:rPr lang="en-US" smtClean="0"/>
-              <a:t>5/14/2024</a:t>
+              <a:t>6/5/2024</a:t>
             </a:fld>
             <a:endParaRPr lang="en-US"/>
           </a:p>
@@ -3041,7 +3041,7 @@
           <a:p>
             <a:fld id="{44CBD428-9F02-4F1C-9708-EBB07AC8C77B}" type="datetime1">
               <a:rPr lang="en-US" smtClean="0"/>
-              <a:t>5/14/2024</a:t>
+              <a:t>6/5/2024</a:t>
             </a:fld>
             <a:endParaRPr lang="en-US"/>
           </a:p>
@@ -3476,7 +3476,7 @@
         </p:nvSpPr>
         <p:spPr>
           <a:xfrm>
-            <a:off x="990600" y="1143000"/>
+            <a:off x="960120" y="126712"/>
             <a:ext cx="2743200" cy="584775"/>
           </a:xfrm>
           <a:prstGeom prst="rect">
@@ -3509,8 +3509,8 @@
         </p:nvSpPr>
         <p:spPr>
           <a:xfrm>
-            <a:off x="914400" y="1905000"/>
-            <a:ext cx="5943600" cy="4524315"/>
+            <a:off x="851835" y="533400"/>
+            <a:ext cx="4587243" cy="7017306"/>
           </a:xfrm>
           <a:prstGeom prst="rect">
             <a:avLst/>
@@ -3528,7 +3528,7 @@
               <a:buAutoNum type="arabicPeriod"/>
             </a:pPr>
             <a:r>
-              <a:rPr lang="en-US" sz="2400" dirty="0"/>
+              <a:rPr lang="en-US" dirty="0"/>
               <a:t>Dashboard</a:t>
             </a:r>
           </a:p>
@@ -3538,7 +3538,7 @@
               <a:buAutoNum type="arabicPeriod"/>
             </a:pPr>
             <a:r>
-              <a:rPr lang="en-US" sz="2400" dirty="0"/>
+              <a:rPr lang="en-US" dirty="0"/>
               <a:t>Project</a:t>
             </a:r>
           </a:p>
@@ -3548,7 +3548,7 @@
               <a:buAutoNum type="arabicPeriod"/>
             </a:pPr>
             <a:r>
-              <a:rPr lang="en-US" sz="2400" dirty="0"/>
+              <a:rPr lang="en-US" dirty="0"/>
               <a:t>Resource</a:t>
             </a:r>
           </a:p>
@@ -3558,7 +3558,7 @@
               <a:buAutoNum type="arabicPeriod"/>
             </a:pPr>
             <a:r>
-              <a:rPr lang="en-US" sz="2400" dirty="0"/>
+              <a:rPr lang="en-US" dirty="0"/>
               <a:t>Timesheet</a:t>
             </a:r>
           </a:p>
@@ -3568,7 +3568,7 @@
               <a:buAutoNum type="arabicPeriod"/>
             </a:pPr>
             <a:r>
-              <a:rPr lang="en-US" sz="2400" dirty="0"/>
+              <a:rPr lang="en-US" dirty="0"/>
               <a:t>Leave Management</a:t>
             </a:r>
           </a:p>
@@ -3578,7 +3578,7 @@
               <a:buAutoNum type="arabicPeriod"/>
             </a:pPr>
             <a:r>
-              <a:rPr lang="en-US" sz="2400" dirty="0"/>
+              <a:rPr lang="en-US" dirty="0"/>
               <a:t>Leave encashment calculation</a:t>
             </a:r>
           </a:p>
@@ -3588,7 +3588,7 @@
               <a:buAutoNum type="arabicPeriod"/>
             </a:pPr>
             <a:r>
-              <a:rPr lang="en-US" sz="2400" dirty="0"/>
+              <a:rPr lang="en-US" dirty="0"/>
               <a:t>Attendance Reminder</a:t>
             </a:r>
           </a:p>
@@ -3598,7 +3598,7 @@
               <a:buAutoNum type="arabicPeriod"/>
             </a:pPr>
             <a:r>
-              <a:rPr lang="en-US" sz="2400" dirty="0"/>
+              <a:rPr lang="en-US" dirty="0"/>
               <a:t>Yearly Leave Plan</a:t>
             </a:r>
           </a:p>
@@ -3608,7 +3608,7 @@
               <a:buAutoNum type="arabicPeriod"/>
             </a:pPr>
             <a:r>
-              <a:rPr lang="en-US" sz="2400" dirty="0"/>
+              <a:rPr lang="en-US" dirty="0"/>
               <a:t>Notification</a:t>
             </a:r>
           </a:p>
@@ -3618,7 +3618,7 @@
               <a:buAutoNum type="arabicPeriod"/>
             </a:pPr>
             <a:r>
-              <a:rPr lang="en-US" sz="2400" dirty="0"/>
+              <a:rPr lang="en-US" dirty="0"/>
               <a:t>Asset</a:t>
             </a:r>
           </a:p>
@@ -3628,7 +3628,7 @@
               <a:buAutoNum type="arabicPeriod"/>
             </a:pPr>
             <a:r>
-              <a:rPr lang="en-US" sz="2400" dirty="0"/>
+              <a:rPr lang="en-US" dirty="0"/>
               <a:t>Email Template</a:t>
             </a:r>
           </a:p>
@@ -3638,9 +3638,158 @@
               <a:buAutoNum type="arabicPeriod"/>
             </a:pPr>
             <a:r>
-              <a:rPr lang="en-US" sz="2400" dirty="0"/>
+              <a:rPr lang="en-US" dirty="0"/>
               <a:t>Allocate Resources (play ground)</a:t>
             </a:r>
+          </a:p>
+          <a:p>
+            <a:pPr marL="342900" indent="-342900">
+              <a:buFont typeface="+mj-lt"/>
+              <a:buAutoNum type="arabicPeriod"/>
+            </a:pPr>
+            <a:r>
+              <a:rPr lang="en-US" dirty="0"/>
+              <a:t>General storage to </a:t>
+            </a:r>
+            <a:r>
+              <a:rPr lang="en-US" dirty="0" err="1"/>
+              <a:t>Hr</a:t>
+            </a:r>
+            <a:r>
+              <a:rPr lang="en-US" dirty="0"/>
+              <a:t> policies etc.</a:t>
+            </a:r>
+          </a:p>
+          <a:p>
+            <a:pPr marL="342900" indent="-342900">
+              <a:buFont typeface="+mj-lt"/>
+              <a:buAutoNum type="arabicPeriod"/>
+            </a:pPr>
+            <a:r>
+              <a:rPr lang="en-US" dirty="0"/>
+              <a:t>Certification &amp; approval</a:t>
+            </a:r>
+          </a:p>
+          <a:p>
+            <a:pPr marL="342900" indent="-342900">
+              <a:buFont typeface="+mj-lt"/>
+              <a:buAutoNum type="arabicPeriod"/>
+            </a:pPr>
+            <a:r>
+              <a:rPr lang="en-US" dirty="0"/>
+              <a:t>Post articles, Buzz</a:t>
+            </a:r>
+          </a:p>
+          <a:p>
+            <a:pPr marL="342900" indent="-342900">
+              <a:buFont typeface="+mj-lt"/>
+              <a:buAutoNum type="arabicPeriod"/>
+            </a:pPr>
+            <a:r>
+              <a:rPr lang="en-US" dirty="0"/>
+              <a:t>Learning</a:t>
+            </a:r>
+          </a:p>
+          <a:p>
+            <a:pPr marL="342900" indent="-342900">
+              <a:buFont typeface="+mj-lt"/>
+              <a:buAutoNum type="arabicPeriod"/>
+            </a:pPr>
+            <a:r>
+              <a:rPr lang="en-US" dirty="0" err="1"/>
+              <a:t>OnBoarding</a:t>
+            </a:r>
+            <a:r>
+              <a:rPr lang="en-US" dirty="0"/>
+              <a:t> </a:t>
+            </a:r>
+          </a:p>
+          <a:p>
+            <a:pPr marL="342900" indent="-342900">
+              <a:buFont typeface="+mj-lt"/>
+              <a:buAutoNum type="arabicPeriod"/>
+            </a:pPr>
+            <a:r>
+              <a:rPr lang="en-US" dirty="0"/>
+              <a:t>Post vacancy ( </a:t>
+            </a:r>
+            <a:r>
+              <a:rPr lang="en-US" dirty="0" err="1"/>
+              <a:t>ihrm</a:t>
+            </a:r>
+            <a:r>
+              <a:rPr lang="en-US" dirty="0"/>
+              <a:t> to </a:t>
+            </a:r>
+            <a:r>
+              <a:rPr lang="en-US" dirty="0" err="1"/>
+              <a:t>linkedin</a:t>
+            </a:r>
+            <a:r>
+              <a:rPr lang="en-US" dirty="0"/>
+              <a:t> )</a:t>
+            </a:r>
+          </a:p>
+          <a:p>
+            <a:pPr marL="342900" indent="-342900">
+              <a:buFont typeface="+mj-lt"/>
+              <a:buAutoNum type="arabicPeriod"/>
+            </a:pPr>
+            <a:r>
+              <a:rPr lang="en-US" dirty="0"/>
+              <a:t>Resignation </a:t>
+            </a:r>
+          </a:p>
+          <a:p>
+            <a:pPr marL="342900" indent="-342900">
+              <a:buFont typeface="+mj-lt"/>
+              <a:buAutoNum type="arabicPeriod"/>
+            </a:pPr>
+            <a:r>
+              <a:rPr lang="en-US" dirty="0"/>
+              <a:t>2FA forgot password</a:t>
+            </a:r>
+          </a:p>
+          <a:p>
+            <a:pPr marL="342900" indent="-342900">
+              <a:buFont typeface="+mj-lt"/>
+              <a:buAutoNum type="arabicPeriod"/>
+            </a:pPr>
+            <a:r>
+              <a:rPr lang="en-US" dirty="0"/>
+              <a:t>Corporate branding</a:t>
+            </a:r>
+          </a:p>
+          <a:p>
+            <a:pPr marL="342900" indent="-342900">
+              <a:buFont typeface="+mj-lt"/>
+              <a:buAutoNum type="arabicPeriod"/>
+            </a:pPr>
+            <a:r>
+              <a:rPr lang="en-US" dirty="0"/>
+              <a:t>Module Configuration</a:t>
+            </a:r>
+          </a:p>
+          <a:p>
+            <a:pPr marL="342900" indent="-342900">
+              <a:buFont typeface="+mj-lt"/>
+              <a:buAutoNum type="arabicPeriod"/>
+            </a:pPr>
+            <a:r>
+              <a:rPr lang="en-US" dirty="0"/>
+              <a:t>Performance Appraisal</a:t>
+            </a:r>
+            <a:br>
+              <a:rPr lang="en-US" dirty="0"/>
+            </a:br>
+            <a:endParaRPr lang="en-US" dirty="0"/>
+          </a:p>
+          <a:p>
+            <a:pPr marL="342900" indent="-342900">
+              <a:buFont typeface="+mj-lt"/>
+              <a:buAutoNum type="arabicPeriod"/>
+            </a:pPr>
+            <a:endParaRPr lang="en-US" dirty="0"/>
           </a:p>
         </p:txBody>
       </p:sp>
@@ -3993,7 +4142,7 @@
         <p:spPr>
           <a:xfrm>
             <a:off x="1066800" y="2209800"/>
-            <a:ext cx="4572000" cy="2862322"/>
+            <a:ext cx="4572000" cy="2585323"/>
           </a:xfrm>
           <a:prstGeom prst="rect">
             <a:avLst/>
@@ -4072,16 +4221,6 @@
             <a:r>
               <a:rPr lang="en-US" dirty="0"/>
               <a:t>Notifications and Reminders</a:t>
-            </a:r>
-          </a:p>
-          <a:p>
-            <a:pPr marL="342900" indent="-342900">
-              <a:buFont typeface="+mj-lt"/>
-              <a:buAutoNum type="arabicPeriod"/>
-            </a:pPr>
-            <a:r>
-              <a:rPr lang="en-US" dirty="0"/>
-              <a:t>Audit Trail</a:t>
             </a:r>
           </a:p>
           <a:p>
@@ -6296,7 +6435,7 @@
         <p:spPr>
           <a:xfrm>
             <a:off x="838200" y="1905000"/>
-            <a:ext cx="5943600" cy="3108543"/>
+            <a:ext cx="5943600" cy="3539430"/>
           </a:xfrm>
           <a:prstGeom prst="rect">
             <a:avLst/>
@@ -6376,6 +6515,16 @@
             <a:r>
               <a:rPr lang="en-US" sz="2800" dirty="0"/>
               <a:t>View Notification</a:t>
+            </a:r>
+          </a:p>
+          <a:p>
+            <a:pPr marL="342900" indent="-342900">
+              <a:buFont typeface="+mj-lt"/>
+              <a:buAutoNum type="arabicPeriod"/>
+            </a:pPr>
+            <a:r>
+              <a:rPr lang="en-US" sz="2800" dirty="0"/>
+              <a:t>Pending approvals</a:t>
             </a:r>
           </a:p>
         </p:txBody>
@@ -6761,6 +6910,72 @@
               <a:rPr lang="en-US" sz="3200" b="1" dirty="0"/>
               <a:t>User Email Template</a:t>
             </a:r>
+          </a:p>
+        </p:txBody>
+      </p:sp>
+      <p:sp>
+        <p:nvSpPr>
+          <p:cNvPr id="4" name="TextBox 3">
+            <a:extLst>
+              <a:ext uri="{FF2B5EF4-FFF2-40B4-BE49-F238E27FC236}">
+                <a16:creationId xmlns:a16="http://schemas.microsoft.com/office/drawing/2014/main" id="{5A9E691A-D0E7-37B5-4280-79C62068E016}"/>
+              </a:ext>
+            </a:extLst>
+          </p:cNvPr>
+          <p:cNvSpPr txBox="1"/>
+          <p:nvPr/>
+        </p:nvSpPr>
+        <p:spPr>
+          <a:xfrm>
+            <a:off x="1219200" y="1981200"/>
+            <a:ext cx="2613729" cy="1200329"/>
+          </a:xfrm>
+          <a:prstGeom prst="rect">
+            <a:avLst/>
+          </a:prstGeom>
+          <a:noFill/>
+        </p:spPr>
+        <p:txBody>
+          <a:bodyPr wrap="none" rtlCol="0">
+            <a:spAutoFit/>
+          </a:bodyPr>
+          <a:lstStyle/>
+          <a:p>
+            <a:pPr marL="342900" indent="-342900">
+              <a:buFont typeface="+mj-lt"/>
+              <a:buAutoNum type="arabicPeriod"/>
+            </a:pPr>
+            <a:r>
+              <a:rPr lang="en-US" dirty="0"/>
+              <a:t>Loan proof request</a:t>
+            </a:r>
+          </a:p>
+          <a:p>
+            <a:pPr marL="342900" indent="-342900">
+              <a:buFont typeface="+mj-lt"/>
+              <a:buAutoNum type="arabicPeriod"/>
+            </a:pPr>
+            <a:r>
+              <a:rPr lang="en-US" dirty="0"/>
+              <a:t>Address proof request</a:t>
+            </a:r>
+          </a:p>
+          <a:p>
+            <a:pPr marL="342900" indent="-342900">
+              <a:buFont typeface="+mj-lt"/>
+              <a:buAutoNum type="arabicPeriod"/>
+            </a:pPr>
+            <a:r>
+              <a:rPr lang="en-US" dirty="0"/>
+              <a:t>All doc request</a:t>
+            </a:r>
+          </a:p>
+          <a:p>
+            <a:pPr marL="342900" indent="-342900">
+              <a:buFont typeface="+mj-lt"/>
+              <a:buAutoNum type="arabicPeriod"/>
+            </a:pPr>
+            <a:endParaRPr lang="en-US" dirty="0"/>
           </a:p>
         </p:txBody>
       </p:sp>

</xml_diff>